<commit_message>
changed few in ppt
</commit_message>
<xml_diff>
--- a/habit-tracker-app-ppt.pptx
+++ b/habit-tracker-app-ppt.pptx
@@ -9662,6 +9662,23 @@
 </file>
 
 <file path=customXml/item1.xml><?xml version="1.0" encoding="utf-8"?>
+<p:properties xmlns:p="http://schemas.microsoft.com/office/2006/metadata/properties" xmlns:xsi="http://www.w3.org/2001/XMLSchema-instance" xmlns:pc="http://schemas.microsoft.com/office/infopath/2007/PartnerControls">
+  <documentManagement>
+    <_activity xmlns="a63d3556-14c1-4f86-a0e8-4ad99b74c6aa" xsi:nil="true"/>
+  </documentManagement>
+</p:properties>
+</file>
+
+<file path=customXml/item2.xml><?xml version="1.0" encoding="utf-8"?>
+<?mso-contentType ?>
+<FormTemplates xmlns="http://schemas.microsoft.com/sharepoint/v3/contenttype/forms">
+  <Display>DocumentLibraryForm</Display>
+  <Edit>DocumentLibraryForm</Edit>
+  <New>DocumentLibraryForm</New>
+</FormTemplates>
+</file>
+
+<file path=customXml/item3.xml><?xml version="1.0" encoding="utf-8"?>
 <ct:contentTypeSchema xmlns:ct="http://schemas.microsoft.com/office/2006/metadata/contentType" xmlns:ma="http://schemas.microsoft.com/office/2006/metadata/properties/metaAttributes" ct:_="" ma:_="" ma:contentTypeName="Document" ma:contentTypeID="0x0101007963412CE6C9DB4FAE65F9FEF90AF30F" ma:contentTypeVersion="14" ma:contentTypeDescription="Create a new document." ma:contentTypeScope="" ma:versionID="0f2f678f5d95322b1ce42ee23c62a676">
   <xsd:schema xmlns:xsd="http://www.w3.org/2001/XMLSchema" xmlns:xs="http://www.w3.org/2001/XMLSchema" xmlns:p="http://schemas.microsoft.com/office/2006/metadata/properties" xmlns:ns3="6b25c4fa-f291-4632-8a36-1c74be72259a" xmlns:ns4="a63d3556-14c1-4f86-a0e8-4ad99b74c6aa" targetNamespace="http://schemas.microsoft.com/office/2006/metadata/properties" ma:root="true" ma:fieldsID="05ec619dff014e04b41e98e0e2d93399" ns3:_="" ns4:_="">
     <xsd:import namespace="6b25c4fa-f291-4632-8a36-1c74be72259a"/>
@@ -9890,24 +9907,25 @@
 </ct:contentTypeSchema>
 </file>
 
-<file path=customXml/item2.xml><?xml version="1.0" encoding="utf-8"?>
-<?mso-contentType ?>
-<FormTemplates xmlns="http://schemas.microsoft.com/sharepoint/v3/contenttype/forms">
-  <Display>DocumentLibraryForm</Display>
-  <Edit>DocumentLibraryForm</Edit>
-  <New>DocumentLibraryForm</New>
-</FormTemplates>
+<file path=customXml/itemProps1.xml><?xml version="1.0" encoding="utf-8"?>
+<ds:datastoreItem xmlns:ds="http://schemas.openxmlformats.org/officeDocument/2006/customXml" ds:itemID="{77E1066D-2DDA-4EE1-BD9A-A3B3D7BC0460}">
+  <ds:schemaRefs>
+    <ds:schemaRef ds:uri="http://schemas.microsoft.com/office/2006/metadata/properties"/>
+    <ds:schemaRef ds:uri="http://schemas.microsoft.com/office/infopath/2007/PartnerControls"/>
+    <ds:schemaRef ds:uri="a63d3556-14c1-4f86-a0e8-4ad99b74c6aa"/>
+  </ds:schemaRefs>
+</ds:datastoreItem>
 </file>
 
-<file path=customXml/item3.xml><?xml version="1.0" encoding="utf-8"?>
-<p:properties xmlns:p="http://schemas.microsoft.com/office/2006/metadata/properties" xmlns:xsi="http://www.w3.org/2001/XMLSchema-instance" xmlns:pc="http://schemas.microsoft.com/office/infopath/2007/PartnerControls">
-  <documentManagement>
-    <_activity xmlns="a63d3556-14c1-4f86-a0e8-4ad99b74c6aa" xsi:nil="true"/>
-  </documentManagement>
-</p:properties>
+<file path=customXml/itemProps2.xml><?xml version="1.0" encoding="utf-8"?>
+<ds:datastoreItem xmlns:ds="http://schemas.openxmlformats.org/officeDocument/2006/customXml" ds:itemID="{9FC3FAB6-3D9D-497D-A32A-34B3676893EC}">
+  <ds:schemaRefs>
+    <ds:schemaRef ds:uri="http://schemas.microsoft.com/sharepoint/v3/contenttype/forms"/>
+  </ds:schemaRefs>
+</ds:datastoreItem>
 </file>
 
-<file path=customXml/itemProps1.xml><?xml version="1.0" encoding="utf-8"?>
+<file path=customXml/itemProps3.xml><?xml version="1.0" encoding="utf-8"?>
 <ds:datastoreItem xmlns:ds="http://schemas.openxmlformats.org/officeDocument/2006/customXml" ds:itemID="{EB51000E-7649-473F-8A26-A3A898926AF3}">
   <ds:schemaRefs>
     <ds:schemaRef ds:uri="http://schemas.microsoft.com/office/2006/metadata/contentType"/>
@@ -9924,22 +9942,4 @@
     <ds:schemaRef ds:uri="http://schemas.microsoft.com/internal/obd"/>
   </ds:schemaRefs>
 </ds:datastoreItem>
-</file>
-
-<file path=customXml/itemProps2.xml><?xml version="1.0" encoding="utf-8"?>
-<ds:datastoreItem xmlns:ds="http://schemas.openxmlformats.org/officeDocument/2006/customXml" ds:itemID="{9FC3FAB6-3D9D-497D-A32A-34B3676893EC}">
-  <ds:schemaRefs>
-    <ds:schemaRef ds:uri="http://schemas.microsoft.com/sharepoint/v3/contenttype/forms"/>
-  </ds:schemaRefs>
-</ds:datastoreItem>
-</file>
-
-<file path=customXml/itemProps3.xml><?xml version="1.0" encoding="utf-8"?>
-<ds:datastoreItem xmlns:ds="http://schemas.openxmlformats.org/officeDocument/2006/customXml" ds:itemID="{77E1066D-2DDA-4EE1-BD9A-A3B3D7BC0460}">
-  <ds:schemaRefs>
-    <ds:schemaRef ds:uri="http://schemas.microsoft.com/office/2006/metadata/properties"/>
-    <ds:schemaRef ds:uri="http://schemas.microsoft.com/office/infopath/2007/PartnerControls"/>
-    <ds:schemaRef ds:uri="a63d3556-14c1-4f86-a0e8-4ad99b74c6aa"/>
-  </ds:schemaRefs>
-</ds:datastoreItem>
 </file>
</xml_diff>